<commit_message>
Added an fft to the script
</commit_message>
<xml_diff>
--- a/attempt1_3Cylinders_Undersampled/6_7_2021_DOA.pptx
+++ b/attempt1_3Cylinders_Undersampled/6_7_2021_DOA.pptx
@@ -5,17 +5,18 @@
     <p:sldMasterId id="2147483648" r:id="rId1"/>
   </p:sldMasterIdLst>
   <p:notesMasterIdLst>
-    <p:notesMasterId r:id="rId10"/>
+    <p:notesMasterId r:id="rId11"/>
   </p:notesMasterIdLst>
   <p:sldIdLst>
     <p:sldId id="967" r:id="rId2"/>
     <p:sldId id="968" r:id="rId3"/>
-    <p:sldId id="969" r:id="rId4"/>
-    <p:sldId id="970" r:id="rId5"/>
-    <p:sldId id="971" r:id="rId6"/>
-    <p:sldId id="256" r:id="rId7"/>
-    <p:sldId id="277" r:id="rId8"/>
-    <p:sldId id="278" r:id="rId9"/>
+    <p:sldId id="970" r:id="rId4"/>
+    <p:sldId id="971" r:id="rId5"/>
+    <p:sldId id="972" r:id="rId6"/>
+    <p:sldId id="973" r:id="rId7"/>
+    <p:sldId id="256" r:id="rId8"/>
+    <p:sldId id="277" r:id="rId9"/>
+    <p:sldId id="278" r:id="rId10"/>
   </p:sldIdLst>
   <p:sldSz cx="9144000" cy="6858000" type="screen4x3"/>
   <p:notesSz cx="7102475" cy="9388475"/>
@@ -235,7 +236,7 @@
             <a:fld id="{5E9142C6-0C0F-4523-8617-D681B0B282CD}" type="datetimeFigureOut">
               <a:rPr lang="en-US" smtClean="0"/>
               <a:pPr/>
-              <a:t>6/7/21</a:t>
+              <a:t>6/8/21</a:t>
             </a:fld>
             <a:endParaRPr lang="en-US" dirty="0"/>
           </a:p>
@@ -569,7 +570,7 @@
             <a:fld id="{38F306BB-E77A-48F7-A486-4B2E87722D39}" type="slidenum">
               <a:rPr lang="en-US" smtClean="0"/>
               <a:pPr/>
-              <a:t>7</a:t>
+              <a:t>8</a:t>
             </a:fld>
             <a:endParaRPr lang="en-US" dirty="0"/>
           </a:p>
@@ -654,7 +655,7 @@
             <a:fld id="{38F306BB-E77A-48F7-A486-4B2E87722D39}" type="slidenum">
               <a:rPr lang="en-US" smtClean="0"/>
               <a:pPr/>
-              <a:t>8</a:t>
+              <a:t>9</a:t>
             </a:fld>
             <a:endParaRPr lang="en-US" dirty="0"/>
           </a:p>
@@ -1711,8 +1712,8 @@
           </a:p>
         </p:txBody>
       </p:sp>
-      <mc:AlternateContent xmlns:mc="http://schemas.openxmlformats.org/markup-compatibility/2006">
-        <mc:Choice xmlns:a14="http://schemas.microsoft.com/office/drawing/2010/main" Requires="a14">
+      <mc:AlternateContent xmlns:mc="http://schemas.openxmlformats.org/markup-compatibility/2006" xmlns:a14="http://schemas.microsoft.com/office/drawing/2010/main">
+        <mc:Choice Requires="a14">
           <p:sp>
             <p:nvSpPr>
               <p:cNvPr id="23" name="TextBox 22">
@@ -1741,6 +1742,7 @@
               </a:bodyPr>
               <a:lstStyle/>
               <a:p>
+                <a:pPr/>
                 <a14:m>
                   <m:oMathPara xmlns:m="http://schemas.openxmlformats.org/officeDocument/2006/math">
                     <m:oMathParaPr>
@@ -1761,7 +1763,7 @@
             </p:txBody>
           </p:sp>
         </mc:Choice>
-        <mc:Fallback>
+        <mc:Fallback xmlns="">
           <p:sp>
             <p:nvSpPr>
               <p:cNvPr id="23" name="TextBox 22">
@@ -2126,8 +2128,8 @@
           </a:p>
         </p:txBody>
       </p:sp>
-      <mc:AlternateContent xmlns:mc="http://schemas.openxmlformats.org/markup-compatibility/2006">
-        <mc:Choice xmlns:a14="http://schemas.microsoft.com/office/drawing/2010/main" Requires="a14">
+      <mc:AlternateContent xmlns:mc="http://schemas.openxmlformats.org/markup-compatibility/2006" xmlns:a14="http://schemas.microsoft.com/office/drawing/2010/main">
+        <mc:Choice Requires="a14">
           <p:sp>
             <p:nvSpPr>
               <p:cNvPr id="40" name="TextBox 39">
@@ -2156,6 +2158,7 @@
               </a:bodyPr>
               <a:lstStyle/>
               <a:p>
+                <a:pPr/>
                 <a14:m>
                   <m:oMathPara xmlns:m="http://schemas.openxmlformats.org/officeDocument/2006/math">
                     <m:oMathParaPr>
@@ -2196,7 +2199,7 @@
             </p:txBody>
           </p:sp>
         </mc:Choice>
-        <mc:Fallback>
+        <mc:Fallback xmlns="">
           <p:sp>
             <p:nvSpPr>
               <p:cNvPr id="40" name="TextBox 39">
@@ -2297,8 +2300,8 @@
           </a:p>
         </p:txBody>
       </p:sp>
-      <mc:AlternateContent xmlns:mc="http://schemas.openxmlformats.org/markup-compatibility/2006">
-        <mc:Choice xmlns:a14="http://schemas.microsoft.com/office/drawing/2010/main" Requires="a14">
+      <mc:AlternateContent xmlns:mc="http://schemas.openxmlformats.org/markup-compatibility/2006" xmlns:a14="http://schemas.microsoft.com/office/drawing/2010/main">
+        <mc:Choice Requires="a14">
           <p:sp>
             <p:nvSpPr>
               <p:cNvPr id="44" name="TextBox 43">
@@ -2327,6 +2330,7 @@
               </a:bodyPr>
               <a:lstStyle/>
               <a:p>
+                <a:pPr/>
                 <a14:m>
                   <m:oMathPara xmlns:m="http://schemas.openxmlformats.org/officeDocument/2006/math">
                     <m:oMathParaPr>
@@ -2348,7 +2352,7 @@
             </p:txBody>
           </p:sp>
         </mc:Choice>
-        <mc:Fallback>
+        <mc:Fallback xmlns="">
           <p:sp>
             <p:nvSpPr>
               <p:cNvPr id="44" name="TextBox 43">
@@ -2590,8 +2594,8 @@
           </a:p>
         </p:txBody>
       </p:sp>
-      <mc:AlternateContent xmlns:mc="http://schemas.openxmlformats.org/markup-compatibility/2006">
-        <mc:Choice xmlns:a14="http://schemas.microsoft.com/office/drawing/2010/main" Requires="a14">
+      <mc:AlternateContent xmlns:mc="http://schemas.openxmlformats.org/markup-compatibility/2006" xmlns:a14="http://schemas.microsoft.com/office/drawing/2010/main">
+        <mc:Choice Requires="a14">
           <p:sp>
             <p:nvSpPr>
               <p:cNvPr id="52" name="TextBox 51">
@@ -2620,6 +2624,7 @@
               </a:bodyPr>
               <a:lstStyle/>
               <a:p>
+                <a:pPr/>
                 <a14:m>
                   <m:oMathPara xmlns:m="http://schemas.openxmlformats.org/officeDocument/2006/math">
                     <m:oMathParaPr>
@@ -2641,7 +2646,7 @@
             </p:txBody>
           </p:sp>
         </mc:Choice>
-        <mc:Fallback>
+        <mc:Fallback xmlns="">
           <p:sp>
             <p:nvSpPr>
               <p:cNvPr id="52" name="TextBox 51">
@@ -2929,7 +2934,7 @@
             <p:spPr>
               <a:xfrm>
                 <a:off x="140912" y="4360294"/>
-                <a:ext cx="3714450" cy="2015167"/>
+                <a:ext cx="3714450" cy="2384307"/>
               </a:xfrm>
               <a:prstGeom prst="rect">
                 <a:avLst/>
@@ -3018,7 +3023,7 @@
                             <a:latin typeface="Cambria Math" panose="02040503050406030204" pitchFamily="18" charset="0"/>
                             <a:ea typeface="Cambria Math" panose="02040503050406030204" pitchFamily="18" charset="0"/>
                           </a:rPr>
-                          <m:t>𝑓</m:t>
+                          <m:t>𝑘</m:t>
                         </m:r>
                       </m:e>
                       <m:sub>
@@ -3098,7 +3103,7 @@
                             <a:latin typeface="Cambria Math" panose="02040503050406030204" pitchFamily="18" charset="0"/>
                             <a:ea typeface="Cambria Math" panose="02040503050406030204" pitchFamily="18" charset="0"/>
                           </a:rPr>
-                          <m:t>𝑓</m:t>
+                          <m:t>𝑘</m:t>
                         </m:r>
                       </m:e>
                       <m:sub>
@@ -3175,6 +3180,213 @@
                         </m:d>
                       </m:e>
                     </m:func>
+                  </m:oMath>
+                </a14:m>
+                <a:r>
+                  <a:rPr lang="en-US" b="0" dirty="0">
+                    <a:ea typeface="Cambria Math" panose="02040503050406030204" pitchFamily="18" charset="0"/>
+                  </a:rPr>
+                  <a:t> and </a:t>
+                </a:r>
+                <a14:m>
+                  <m:oMath xmlns:m="http://schemas.openxmlformats.org/officeDocument/2006/math">
+                    <m:sSub>
+                      <m:sSubPr>
+                        <m:ctrlPr>
+                          <a:rPr lang="en-US" b="0" i="1" smtClean="0">
+                            <a:latin typeface="Cambria Math" panose="02040503050406030204" pitchFamily="18" charset="0"/>
+                            <a:ea typeface="Cambria Math" panose="02040503050406030204" pitchFamily="18" charset="0"/>
+                          </a:rPr>
+                        </m:ctrlPr>
+                      </m:sSubPr>
+                      <m:e>
+                        <m:r>
+                          <a:rPr lang="en-US" b="0" i="1" smtClean="0">
+                            <a:latin typeface="Cambria Math" panose="02040503050406030204" pitchFamily="18" charset="0"/>
+                            <a:ea typeface="Cambria Math" panose="02040503050406030204" pitchFamily="18" charset="0"/>
+                          </a:rPr>
+                          <m:t>𝑓</m:t>
+                        </m:r>
+                      </m:e>
+                      <m:sub>
+                        <m:r>
+                          <a:rPr lang="en-US" b="0" i="1" smtClean="0">
+                            <a:latin typeface="Cambria Math" panose="02040503050406030204" pitchFamily="18" charset="0"/>
+                            <a:ea typeface="Cambria Math" panose="02040503050406030204" pitchFamily="18" charset="0"/>
+                          </a:rPr>
+                          <m:t>𝑠𝑝𝑎𝑡</m:t>
+                        </m:r>
+                      </m:sub>
+                    </m:sSub>
+                    <m:r>
+                      <a:rPr lang="en-US" b="0" i="1" smtClean="0">
+                        <a:latin typeface="Cambria Math" panose="02040503050406030204" pitchFamily="18" charset="0"/>
+                        <a:ea typeface="Cambria Math" panose="02040503050406030204" pitchFamily="18" charset="0"/>
+                      </a:rPr>
+                      <m:t>=</m:t>
+                    </m:r>
+                    <m:sSub>
+                      <m:sSubPr>
+                        <m:ctrlPr>
+                          <a:rPr lang="en-US" b="0" i="1" smtClean="0">
+                            <a:latin typeface="Cambria Math" panose="02040503050406030204" pitchFamily="18" charset="0"/>
+                            <a:ea typeface="Cambria Math" panose="02040503050406030204" pitchFamily="18" charset="0"/>
+                          </a:rPr>
+                        </m:ctrlPr>
+                      </m:sSubPr>
+                      <m:e>
+                        <m:r>
+                          <a:rPr lang="en-US" b="0" i="1" smtClean="0">
+                            <a:latin typeface="Cambria Math" panose="02040503050406030204" pitchFamily="18" charset="0"/>
+                            <a:ea typeface="Cambria Math" panose="02040503050406030204" pitchFamily="18" charset="0"/>
+                          </a:rPr>
+                          <m:t>𝑘</m:t>
+                        </m:r>
+                      </m:e>
+                      <m:sub>
+                        <m:r>
+                          <a:rPr lang="en-US" b="0" i="1" smtClean="0">
+                            <a:latin typeface="Cambria Math" panose="02040503050406030204" pitchFamily="18" charset="0"/>
+                            <a:ea typeface="Cambria Math" panose="02040503050406030204" pitchFamily="18" charset="0"/>
+                          </a:rPr>
+                          <m:t>𝑠𝑝𝑎𝑡</m:t>
+                        </m:r>
+                      </m:sub>
+                    </m:sSub>
+                    <m:f>
+                      <m:fPr>
+                        <m:ctrlPr>
+                          <a:rPr lang="en-US" b="0" i="1" smtClean="0">
+                            <a:latin typeface="Cambria Math" panose="02040503050406030204" pitchFamily="18" charset="0"/>
+                            <a:ea typeface="Cambria Math" panose="02040503050406030204" pitchFamily="18" charset="0"/>
+                          </a:rPr>
+                        </m:ctrlPr>
+                      </m:fPr>
+                      <m:num>
+                        <m:r>
+                          <a:rPr lang="en-US" b="0" i="1" smtClean="0">
+                            <a:latin typeface="Cambria Math" panose="02040503050406030204" pitchFamily="18" charset="0"/>
+                            <a:ea typeface="Cambria Math" panose="02040503050406030204" pitchFamily="18" charset="0"/>
+                          </a:rPr>
+                          <m:t>𝑐</m:t>
+                        </m:r>
+                      </m:num>
+                      <m:den>
+                        <m:r>
+                          <a:rPr lang="en-US" b="0" i="1" smtClean="0">
+                            <a:latin typeface="Cambria Math" panose="02040503050406030204" pitchFamily="18" charset="0"/>
+                            <a:ea typeface="Cambria Math" panose="02040503050406030204" pitchFamily="18" charset="0"/>
+                          </a:rPr>
+                          <m:t>2</m:t>
+                        </m:r>
+                        <m:r>
+                          <a:rPr lang="en-US" b="0" i="1" smtClean="0">
+                            <a:latin typeface="Cambria Math" panose="02040503050406030204" pitchFamily="18" charset="0"/>
+                            <a:ea typeface="Cambria Math" panose="02040503050406030204" pitchFamily="18" charset="0"/>
+                          </a:rPr>
+                          <m:t>𝜋</m:t>
+                        </m:r>
+                      </m:den>
+                    </m:f>
+                    <m:r>
+                      <a:rPr lang="en-US" i="1">
+                        <a:latin typeface="Cambria Math" panose="02040503050406030204" pitchFamily="18" charset="0"/>
+                        <a:ea typeface="Cambria Math" panose="02040503050406030204" pitchFamily="18" charset="0"/>
+                      </a:rPr>
+                      <m:t>=2</m:t>
+                    </m:r>
+                    <m:func>
+                      <m:funcPr>
+                        <m:ctrlPr>
+                          <a:rPr lang="en-US" i="1">
+                            <a:latin typeface="Cambria Math" panose="02040503050406030204" pitchFamily="18" charset="0"/>
+                            <a:ea typeface="Cambria Math" panose="02040503050406030204" pitchFamily="18" charset="0"/>
+                          </a:rPr>
+                        </m:ctrlPr>
+                      </m:funcPr>
+                      <m:fName>
+                        <m:r>
+                          <a:rPr lang="en-US" i="1">
+                            <a:latin typeface="Cambria Math" panose="02040503050406030204" pitchFamily="18" charset="0"/>
+                            <a:ea typeface="Cambria Math" panose="02040503050406030204" pitchFamily="18" charset="0"/>
+                          </a:rPr>
+                          <m:t>𝑘</m:t>
+                        </m:r>
+                        <m:r>
+                          <a:rPr lang="en-US" i="1">
+                            <a:latin typeface="Cambria Math" panose="02040503050406030204" pitchFamily="18" charset="0"/>
+                            <a:ea typeface="Cambria Math" panose="02040503050406030204" pitchFamily="18" charset="0"/>
+                          </a:rPr>
+                          <m:t> </m:t>
+                        </m:r>
+                        <m:r>
+                          <m:rPr>
+                            <m:sty m:val="p"/>
+                          </m:rPr>
+                          <a:rPr lang="en-US">
+                            <a:latin typeface="Cambria Math" panose="02040503050406030204" pitchFamily="18" charset="0"/>
+                            <a:ea typeface="Cambria Math" panose="02040503050406030204" pitchFamily="18" charset="0"/>
+                          </a:rPr>
+                          <m:t>sin</m:t>
+                        </m:r>
+                      </m:fName>
+                      <m:e>
+                        <m:d>
+                          <m:dPr>
+                            <m:ctrlPr>
+                              <a:rPr lang="en-US" i="1">
+                                <a:latin typeface="Cambria Math" panose="02040503050406030204" pitchFamily="18" charset="0"/>
+                                <a:ea typeface="Cambria Math" panose="02040503050406030204" pitchFamily="18" charset="0"/>
+                              </a:rPr>
+                            </m:ctrlPr>
+                          </m:dPr>
+                          <m:e>
+                            <m:r>
+                              <a:rPr lang="en-US" i="1">
+                                <a:latin typeface="Cambria Math" panose="02040503050406030204" pitchFamily="18" charset="0"/>
+                                <a:ea typeface="Cambria Math" panose="02040503050406030204" pitchFamily="18" charset="0"/>
+                              </a:rPr>
+                              <m:t>𝜃</m:t>
+                            </m:r>
+                          </m:e>
+                        </m:d>
+                      </m:e>
+                    </m:func>
+                    <m:f>
+                      <m:fPr>
+                        <m:ctrlPr>
+                          <a:rPr lang="en-US" i="1">
+                            <a:latin typeface="Cambria Math" panose="02040503050406030204" pitchFamily="18" charset="0"/>
+                            <a:ea typeface="Cambria Math" panose="02040503050406030204" pitchFamily="18" charset="0"/>
+                          </a:rPr>
+                        </m:ctrlPr>
+                      </m:fPr>
+                      <m:num>
+                        <m:r>
+                          <a:rPr lang="en-US" i="1">
+                            <a:latin typeface="Cambria Math" panose="02040503050406030204" pitchFamily="18" charset="0"/>
+                            <a:ea typeface="Cambria Math" panose="02040503050406030204" pitchFamily="18" charset="0"/>
+                          </a:rPr>
+                          <m:t>𝑐</m:t>
+                        </m:r>
+                      </m:num>
+                      <m:den>
+                        <m:r>
+                          <a:rPr lang="en-US" i="1">
+                            <a:latin typeface="Cambria Math" panose="02040503050406030204" pitchFamily="18" charset="0"/>
+                            <a:ea typeface="Cambria Math" panose="02040503050406030204" pitchFamily="18" charset="0"/>
+                          </a:rPr>
+                          <m:t>2</m:t>
+                        </m:r>
+                        <m:r>
+                          <a:rPr lang="en-US" i="1">
+                            <a:latin typeface="Cambria Math" panose="02040503050406030204" pitchFamily="18" charset="0"/>
+                            <a:ea typeface="Cambria Math" panose="02040503050406030204" pitchFamily="18" charset="0"/>
+                          </a:rPr>
+                          <m:t>𝜋</m:t>
+                        </m:r>
+                      </m:den>
+                    </m:f>
                   </m:oMath>
                 </a14:m>
                 <a:endParaRPr lang="en-US" b="0" dirty="0">
@@ -3264,7 +3476,7 @@
             <p:spPr>
               <a:xfrm>
                 <a:off x="140912" y="4360294"/>
-                <a:ext cx="3714450" cy="2015167"/>
+                <a:ext cx="3714450" cy="2384307"/>
               </a:xfrm>
               <a:prstGeom prst="rect">
                 <a:avLst/>
@@ -3272,7 +3484,7 @@
               <a:blipFill>
                 <a:blip r:embed="rId6"/>
                 <a:stretch>
-                  <a:fillRect l="-1365" t="-1250" r="-2389"/>
+                  <a:fillRect l="-1365" t="-1064" r="-2389" b="-532"/>
                 </a:stretch>
               </a:blipFill>
             </p:spPr>
@@ -3431,7 +3643,7 @@
             <p:spPr>
               <a:xfrm>
                 <a:off x="685893" y="1422400"/>
-                <a:ext cx="7979136" cy="2168351"/>
+                <a:ext cx="7979136" cy="3313471"/>
               </a:xfrm>
               <a:prstGeom prst="rect">
                 <a:avLst/>
@@ -3673,17 +3885,20 @@
                     <m:f>
                       <m:fPr>
                         <m:ctrlPr>
-                          <a:rPr lang="en-US" b="0" i="0" smtClean="0">
+                          <a:rPr lang="en-US" b="0" i="1" smtClean="0">
                             <a:latin typeface="Cambria Math" panose="02040503050406030204" pitchFamily="18" charset="0"/>
                           </a:rPr>
                         </m:ctrlPr>
                       </m:fPr>
                       <m:num>
                         <m:r>
+                          <m:rPr>
+                            <m:sty m:val="p"/>
+                          </m:rPr>
                           <a:rPr lang="en-US" b="0" i="0" smtClean="0">
                             <a:latin typeface="Cambria Math" panose="02040503050406030204" pitchFamily="18" charset="0"/>
                           </a:rPr>
-                          <m:t>1</m:t>
+                          <m:t>c</m:t>
                         </m:r>
                       </m:num>
                       <m:den>
@@ -3742,36 +3957,335 @@
                       <a:rPr lang="en-US" b="0" i="1" smtClean="0">
                         <a:latin typeface="Cambria Math" panose="02040503050406030204" pitchFamily="18" charset="0"/>
                       </a:rPr>
-                      <m:t>=2</m:t>
+                      <m:t>=</m:t>
                     </m:r>
+                    <m:sSub>
+                      <m:sSubPr>
+                        <m:ctrlPr>
+                          <a:rPr lang="en-US" b="0" i="1" smtClean="0">
+                            <a:latin typeface="Cambria Math" panose="02040503050406030204" pitchFamily="18" charset="0"/>
+                          </a:rPr>
+                        </m:ctrlPr>
+                      </m:sSubPr>
+                      <m:e>
+                        <m:r>
+                          <a:rPr lang="en-US" b="0" i="1" smtClean="0">
+                            <a:latin typeface="Cambria Math" panose="02040503050406030204" pitchFamily="18" charset="0"/>
+                          </a:rPr>
+                          <m:t>𝑓</m:t>
+                        </m:r>
+                      </m:e>
+                      <m:sub>
+                        <m:r>
+                          <a:rPr lang="en-US" b="0" i="1" smtClean="0">
+                            <a:latin typeface="Cambria Math" panose="02040503050406030204" pitchFamily="18" charset="0"/>
+                          </a:rPr>
+                          <m:t>𝑛𝑜𝑟𝑚</m:t>
+                        </m:r>
+                      </m:sub>
+                    </m:sSub>
+                    <m:f>
+                      <m:fPr>
+                        <m:ctrlPr>
+                          <a:rPr lang="en-US" b="0" i="1" smtClean="0">
+                            <a:latin typeface="Cambria Math" panose="02040503050406030204" pitchFamily="18" charset="0"/>
+                          </a:rPr>
+                        </m:ctrlPr>
+                      </m:fPr>
+                      <m:num>
+                        <m:r>
+                          <a:rPr lang="en-US" b="0" i="1" smtClean="0">
+                            <a:latin typeface="Cambria Math" panose="02040503050406030204" pitchFamily="18" charset="0"/>
+                          </a:rPr>
+                          <m:t>𝑐</m:t>
+                        </m:r>
+                      </m:num>
+                      <m:den>
+                        <m:r>
+                          <a:rPr lang="en-US" b="0" i="1" smtClean="0">
+                            <a:latin typeface="Cambria Math" panose="02040503050406030204" pitchFamily="18" charset="0"/>
+                          </a:rPr>
+                          <m:t>𝑑</m:t>
+                        </m:r>
+                      </m:den>
+                    </m:f>
                     <m:r>
                       <a:rPr lang="en-US" b="0" i="1" smtClean="0">
                         <a:latin typeface="Cambria Math" panose="02040503050406030204" pitchFamily="18" charset="0"/>
                       </a:rPr>
-                      <m:t>𝑘𝑠𝑖𝑛</m:t>
+                      <m:t>=</m:t>
+                    </m:r>
+                    <m:func>
+                      <m:funcPr>
+                        <m:ctrlPr>
+                          <a:rPr lang="en-US" i="1">
+                            <a:latin typeface="Cambria Math" panose="02040503050406030204" pitchFamily="18" charset="0"/>
+                            <a:ea typeface="Cambria Math" panose="02040503050406030204" pitchFamily="18" charset="0"/>
+                          </a:rPr>
+                        </m:ctrlPr>
+                      </m:funcPr>
+                      <m:fName>
+                        <m:r>
+                          <a:rPr lang="en-US" i="1">
+                            <a:latin typeface="Cambria Math" panose="02040503050406030204" pitchFamily="18" charset="0"/>
+                            <a:ea typeface="Cambria Math" panose="02040503050406030204" pitchFamily="18" charset="0"/>
+                          </a:rPr>
+                          <m:t>𝑘</m:t>
+                        </m:r>
+                        <m:r>
+                          <a:rPr lang="en-US" i="1">
+                            <a:latin typeface="Cambria Math" panose="02040503050406030204" pitchFamily="18" charset="0"/>
+                            <a:ea typeface="Cambria Math" panose="02040503050406030204" pitchFamily="18" charset="0"/>
+                          </a:rPr>
+                          <m:t> </m:t>
+                        </m:r>
+                        <m:r>
+                          <m:rPr>
+                            <m:sty m:val="p"/>
+                          </m:rPr>
+                          <a:rPr lang="en-US">
+                            <a:latin typeface="Cambria Math" panose="02040503050406030204" pitchFamily="18" charset="0"/>
+                            <a:ea typeface="Cambria Math" panose="02040503050406030204" pitchFamily="18" charset="0"/>
+                          </a:rPr>
+                          <m:t>sin</m:t>
+                        </m:r>
+                      </m:fName>
+                      <m:e>
+                        <m:d>
+                          <m:dPr>
+                            <m:ctrlPr>
+                              <a:rPr lang="en-US" i="1">
+                                <a:latin typeface="Cambria Math" panose="02040503050406030204" pitchFamily="18" charset="0"/>
+                                <a:ea typeface="Cambria Math" panose="02040503050406030204" pitchFamily="18" charset="0"/>
+                              </a:rPr>
+                            </m:ctrlPr>
+                          </m:dPr>
+                          <m:e>
+                            <m:r>
+                              <a:rPr lang="en-US" i="1">
+                                <a:latin typeface="Cambria Math" panose="02040503050406030204" pitchFamily="18" charset="0"/>
+                                <a:ea typeface="Cambria Math" panose="02040503050406030204" pitchFamily="18" charset="0"/>
+                              </a:rPr>
+                              <m:t>𝜃</m:t>
+                            </m:r>
+                          </m:e>
+                        </m:d>
+                      </m:e>
+                    </m:func>
+                    <m:f>
+                      <m:fPr>
+                        <m:ctrlPr>
+                          <a:rPr lang="en-US" i="1">
+                            <a:latin typeface="Cambria Math" panose="02040503050406030204" pitchFamily="18" charset="0"/>
+                            <a:ea typeface="Cambria Math" panose="02040503050406030204" pitchFamily="18" charset="0"/>
+                          </a:rPr>
+                        </m:ctrlPr>
+                      </m:fPr>
+                      <m:num>
+                        <m:r>
+                          <a:rPr lang="en-US" i="1">
+                            <a:latin typeface="Cambria Math" panose="02040503050406030204" pitchFamily="18" charset="0"/>
+                            <a:ea typeface="Cambria Math" panose="02040503050406030204" pitchFamily="18" charset="0"/>
+                          </a:rPr>
+                          <m:t>𝑐</m:t>
+                        </m:r>
+                      </m:num>
+                      <m:den>
+                        <m:r>
+                          <a:rPr lang="en-US" i="1">
+                            <a:latin typeface="Cambria Math" panose="02040503050406030204" pitchFamily="18" charset="0"/>
+                            <a:ea typeface="Cambria Math" panose="02040503050406030204" pitchFamily="18" charset="0"/>
+                          </a:rPr>
+                          <m:t>𝜋</m:t>
+                        </m:r>
+                      </m:den>
+                    </m:f>
+                  </m:oMath>
+                </a14:m>
+                <a:endParaRPr lang="en-US" i="1" dirty="0">
+                  <a:latin typeface="Cambria Math" panose="02040503050406030204" pitchFamily="18" charset="0"/>
+                  <a:ea typeface="Cambria Math" panose="02040503050406030204" pitchFamily="18" charset="0"/>
+                </a:endParaRPr>
+              </a:p>
+              <a:p>
+                <a:pPr marL="800100" lvl="1" indent="-342900">
+                  <a:buFont typeface="+mj-lt"/>
+                  <a:buAutoNum type="arabicPeriod"/>
+                </a:pPr>
+                <a14:m>
+                  <m:oMath xmlns:m="http://schemas.openxmlformats.org/officeDocument/2006/math">
+                    <m:func>
+                      <m:funcPr>
+                        <m:ctrlPr>
+                          <a:rPr lang="en-US" b="0" i="1" smtClean="0">
+                            <a:latin typeface="Cambria Math" panose="02040503050406030204" pitchFamily="18" charset="0"/>
+                          </a:rPr>
+                        </m:ctrlPr>
+                      </m:funcPr>
+                      <m:fName>
+                        <m:r>
+                          <m:rPr>
+                            <m:sty m:val="p"/>
+                          </m:rPr>
+                          <a:rPr lang="en-US" b="0" i="0" smtClean="0">
+                            <a:latin typeface="Cambria Math" panose="02040503050406030204" pitchFamily="18" charset="0"/>
+                          </a:rPr>
+                          <m:t>asin</m:t>
+                        </m:r>
+                      </m:fName>
+                      <m:e>
+                        <m:d>
+                          <m:dPr>
+                            <m:ctrlPr>
+                              <a:rPr lang="en-US" b="0" i="1" smtClean="0">
+                                <a:latin typeface="Cambria Math" panose="02040503050406030204" pitchFamily="18" charset="0"/>
+                              </a:rPr>
+                            </m:ctrlPr>
+                          </m:dPr>
+                          <m:e>
+                            <m:f>
+                              <m:fPr>
+                                <m:ctrlPr>
+                                  <a:rPr lang="en-US" b="0" i="1" smtClean="0">
+                                    <a:latin typeface="Cambria Math" panose="02040503050406030204" pitchFamily="18" charset="0"/>
+                                  </a:rPr>
+                                </m:ctrlPr>
+                              </m:fPr>
+                              <m:num>
+                                <m:sSub>
+                                  <m:sSubPr>
+                                    <m:ctrlPr>
+                                      <a:rPr lang="en-US" i="1">
+                                        <a:latin typeface="Cambria Math" panose="02040503050406030204" pitchFamily="18" charset="0"/>
+                                      </a:rPr>
+                                    </m:ctrlPr>
+                                  </m:sSubPr>
+                                  <m:e>
+                                    <m:r>
+                                      <a:rPr lang="en-US" i="1">
+                                        <a:latin typeface="Cambria Math" panose="02040503050406030204" pitchFamily="18" charset="0"/>
+                                      </a:rPr>
+                                      <m:t>𝑓</m:t>
+                                    </m:r>
+                                  </m:e>
+                                  <m:sub>
+                                    <m:r>
+                                      <a:rPr lang="en-US" i="1">
+                                        <a:latin typeface="Cambria Math" panose="02040503050406030204" pitchFamily="18" charset="0"/>
+                                      </a:rPr>
+                                      <m:t>𝑠𝑝𝑎𝑡</m:t>
+                                    </m:r>
+                                  </m:sub>
+                                </m:sSub>
+                                <m:r>
+                                  <a:rPr lang="en-US" b="0" i="1" smtClean="0">
+                                    <a:latin typeface="Cambria Math" panose="02040503050406030204" pitchFamily="18" charset="0"/>
+                                  </a:rPr>
+                                  <m:t> </m:t>
+                                </m:r>
+                                <m:r>
+                                  <a:rPr lang="en-US" b="0" i="1" smtClean="0">
+                                    <a:latin typeface="Cambria Math" panose="02040503050406030204" pitchFamily="18" charset="0"/>
+                                    <a:ea typeface="Cambria Math" panose="02040503050406030204" pitchFamily="18" charset="0"/>
+                                  </a:rPr>
+                                  <m:t>𝜋</m:t>
+                                </m:r>
+                              </m:num>
+                              <m:den>
+                                <m:r>
+                                  <a:rPr lang="en-US" b="0" i="1" smtClean="0">
+                                    <a:latin typeface="Cambria Math" panose="02040503050406030204" pitchFamily="18" charset="0"/>
+                                  </a:rPr>
+                                  <m:t>𝑘𝑐</m:t>
+                                </m:r>
+                              </m:den>
+                            </m:f>
+                          </m:e>
+                        </m:d>
+                      </m:e>
+                    </m:func>
+                    <m:r>
+                      <a:rPr lang="en-US" i="1">
+                        <a:latin typeface="Cambria Math" panose="02040503050406030204" pitchFamily="18" charset="0"/>
+                      </a:rPr>
+                      <m:t>=</m:t>
                     </m:r>
                     <m:r>
-                      <a:rPr lang="en-US" b="0" i="1" smtClean="0">
-                        <a:latin typeface="Cambria Math" panose="02040503050406030204" pitchFamily="18" charset="0"/>
-                      </a:rPr>
-                      <m:t>(</m:t>
-                    </m:r>
-                    <m:r>
-                      <a:rPr lang="en-US" b="0" i="1" smtClean="0">
+                      <a:rPr lang="en-US" i="1">
                         <a:latin typeface="Cambria Math" panose="02040503050406030204" pitchFamily="18" charset="0"/>
                         <a:ea typeface="Cambria Math" panose="02040503050406030204" pitchFamily="18" charset="0"/>
                       </a:rPr>
                       <m:t>𝜃</m:t>
                     </m:r>
+                  </m:oMath>
+                </a14:m>
+                <a:endParaRPr lang="en-US" dirty="0"/>
+              </a:p>
+              <a:p>
+                <a:pPr marL="800100" lvl="1" indent="-342900">
+                  <a:buFont typeface="+mj-lt"/>
+                  <a:buAutoNum type="arabicPeriod"/>
+                </a:pPr>
+                <a14:m>
+                  <m:oMath xmlns:m="http://schemas.openxmlformats.org/officeDocument/2006/math">
                     <m:r>
-                      <a:rPr lang="en-US" b="0" i="1" smtClean="0">
+                      <a:rPr lang="en-US" i="1">
                         <a:latin typeface="Cambria Math" panose="02040503050406030204" pitchFamily="18" charset="0"/>
                         <a:ea typeface="Cambria Math" panose="02040503050406030204" pitchFamily="18" charset="0"/>
                       </a:rPr>
-                      <m:t>)</m:t>
+                      <m:t>𝑘</m:t>
                     </m:r>
+                    <m:r>
+                      <a:rPr lang="en-US" i="1">
+                        <a:latin typeface="Cambria Math" panose="02040503050406030204" pitchFamily="18" charset="0"/>
+                        <a:ea typeface="Cambria Math" panose="02040503050406030204" pitchFamily="18" charset="0"/>
+                      </a:rPr>
+                      <m:t>=</m:t>
+                    </m:r>
+                    <m:f>
+                      <m:fPr>
+                        <m:ctrlPr>
+                          <a:rPr lang="en-US" i="1">
+                            <a:latin typeface="Cambria Math" panose="02040503050406030204" pitchFamily="18" charset="0"/>
+                            <a:ea typeface="Cambria Math" panose="02040503050406030204" pitchFamily="18" charset="0"/>
+                          </a:rPr>
+                        </m:ctrlPr>
+                      </m:fPr>
+                      <m:num>
+                        <m:r>
+                          <a:rPr lang="en-US" i="1">
+                            <a:latin typeface="Cambria Math" panose="02040503050406030204" pitchFamily="18" charset="0"/>
+                            <a:ea typeface="Cambria Math" panose="02040503050406030204" pitchFamily="18" charset="0"/>
+                          </a:rPr>
+                          <m:t>2</m:t>
+                        </m:r>
+                        <m:r>
+                          <a:rPr lang="en-US" i="1">
+                            <a:latin typeface="Cambria Math" panose="02040503050406030204" pitchFamily="18" charset="0"/>
+                            <a:ea typeface="Cambria Math" panose="02040503050406030204" pitchFamily="18" charset="0"/>
+                          </a:rPr>
+                          <m:t>𝜋</m:t>
+                        </m:r>
+                      </m:num>
+                      <m:den>
+                        <m:r>
+                          <a:rPr lang="en-US" i="1">
+                            <a:latin typeface="Cambria Math" panose="02040503050406030204" pitchFamily="18" charset="0"/>
+                            <a:ea typeface="Cambria Math" panose="02040503050406030204" pitchFamily="18" charset="0"/>
+                          </a:rPr>
+                          <m:t>𝜆</m:t>
+                        </m:r>
+                      </m:den>
+                    </m:f>
                   </m:oMath>
                 </a14:m>
+                <a:endParaRPr lang="en-US" dirty="0"/>
+              </a:p>
+              <a:p>
+                <a:pPr marL="800100" lvl="1" indent="-342900">
+                  <a:buFont typeface="+mj-lt"/>
+                  <a:buAutoNum type="arabicPeriod"/>
+                </a:pPr>
                 <a:endParaRPr lang="en-US" dirty="0"/>
               </a:p>
               <a:p>
@@ -3802,7 +4316,7 @@
             <p:spPr>
               <a:xfrm>
                 <a:off x="685893" y="1422400"/>
-                <a:ext cx="7979136" cy="2168351"/>
+                <a:ext cx="7979136" cy="3313471"/>
               </a:xfrm>
               <a:prstGeom prst="rect">
                 <a:avLst/>
@@ -3810,7 +4324,7 @@
               <a:blipFill>
                 <a:blip r:embed="rId2"/>
                 <a:stretch>
-                  <a:fillRect l="-795" t="-1163"/>
+                  <a:fillRect l="-795" t="-763"/>
                 </a:stretch>
               </a:blipFill>
             </p:spPr>
@@ -3864,7 +4378,7 @@
           <p:cNvPr id="2" name="Slide Number Placeholder 1">
             <a:extLst>
               <a:ext uri="{FF2B5EF4-FFF2-40B4-BE49-F238E27FC236}">
-                <a16:creationId xmlns:a16="http://schemas.microsoft.com/office/drawing/2014/main" id="{EDC9BC7C-BD05-3D4C-B03E-D46C89D78756}"/>
+                <a16:creationId xmlns:a16="http://schemas.microsoft.com/office/drawing/2014/main" id="{8662EA60-8CDC-AF40-A553-D07062CAE017}"/>
               </a:ext>
             </a:extLst>
           </p:cNvPr>
@@ -3884,129 +4398,6 @@
               <a:rPr lang="en-US" smtClean="0"/>
               <a:pPr/>
               <a:t>3</a:t>
-            </a:fld>
-            <a:endParaRPr lang="en-US" dirty="0"/>
-          </a:p>
-        </p:txBody>
-      </p:sp>
-      <p:sp>
-        <p:nvSpPr>
-          <p:cNvPr id="3" name="Title 1">
-            <a:extLst>
-              <a:ext uri="{FF2B5EF4-FFF2-40B4-BE49-F238E27FC236}">
-                <a16:creationId xmlns:a16="http://schemas.microsoft.com/office/drawing/2014/main" id="{75308359-8A61-0140-8200-55AE8E347BDF}"/>
-              </a:ext>
-            </a:extLst>
-          </p:cNvPr>
-          <p:cNvSpPr txBox="1">
-            <a:spLocks/>
-          </p:cNvSpPr>
-          <p:nvPr/>
-        </p:nvSpPr>
-        <p:spPr>
-          <a:xfrm>
-            <a:off x="685893" y="169301"/>
-            <a:ext cx="8458107" cy="668337"/>
-          </a:xfrm>
-          <a:prstGeom prst="rect">
-            <a:avLst/>
-          </a:prstGeom>
-          <a:effectLst>
-            <a:outerShdw blurRad="50800" dist="38100" dir="2700000" algn="tl" rotWithShape="0">
-              <a:prstClr val="black">
-                <a:alpha val="40000"/>
-              </a:prstClr>
-            </a:outerShdw>
-          </a:effectLst>
-        </p:spPr>
-        <p:txBody>
-          <a:bodyPr>
-            <a:normAutofit/>
-          </a:bodyPr>
-          <a:lstStyle>
-            <a:lvl1pPr algn="ctr" defTabSz="914400" rtl="0" eaLnBrk="1" latinLnBrk="0" hangingPunct="1">
-              <a:spcBef>
-                <a:spcPct val="0"/>
-              </a:spcBef>
-              <a:buNone/>
-              <a:defRPr sz="4400" kern="1200">
-                <a:solidFill>
-                  <a:schemeClr val="tx1"/>
-                </a:solidFill>
-                <a:latin typeface="+mj-lt"/>
-                <a:ea typeface="+mj-ea"/>
-                <a:cs typeface="+mj-cs"/>
-              </a:defRPr>
-            </a:lvl1pPr>
-          </a:lstStyle>
-          <a:p>
-            <a:r>
-              <a:rPr lang="en-US" sz="2400" b="1" dirty="0">
-                <a:solidFill>
-                  <a:schemeClr val="bg1"/>
-                </a:solidFill>
-                <a:latin typeface="Cambria" pitchFamily="18" charset="0"/>
-              </a:rPr>
-              <a:t>Simulated Results</a:t>
-            </a:r>
-          </a:p>
-        </p:txBody>
-      </p:sp>
-    </p:spTree>
-    <p:extLst>
-      <p:ext uri="{BB962C8B-B14F-4D97-AF65-F5344CB8AC3E}">
-        <p14:creationId xmlns:p14="http://schemas.microsoft.com/office/powerpoint/2010/main" val="1406866974"/>
-      </p:ext>
-    </p:extLst>
-  </p:cSld>
-  <p:clrMapOvr>
-    <a:masterClrMapping/>
-  </p:clrMapOvr>
-</p:sld>
-</file>
-
-<file path=ppt/slides/slide4.xml><?xml version="1.0" encoding="utf-8"?>
-<p:sld xmlns:a="http://schemas.openxmlformats.org/drawingml/2006/main" xmlns:r="http://schemas.openxmlformats.org/officeDocument/2006/relationships" xmlns:p="http://schemas.openxmlformats.org/presentationml/2006/main">
-  <p:cSld>
-    <p:spTree>
-      <p:nvGrpSpPr>
-        <p:cNvPr id="1" name=""/>
-        <p:cNvGrpSpPr/>
-        <p:nvPr/>
-      </p:nvGrpSpPr>
-      <p:grpSpPr>
-        <a:xfrm>
-          <a:off x="0" y="0"/>
-          <a:ext cx="0" cy="0"/>
-          <a:chOff x="0" y="0"/>
-          <a:chExt cx="0" cy="0"/>
-        </a:xfrm>
-      </p:grpSpPr>
-      <p:sp>
-        <p:nvSpPr>
-          <p:cNvPr id="2" name="Slide Number Placeholder 1">
-            <a:extLst>
-              <a:ext uri="{FF2B5EF4-FFF2-40B4-BE49-F238E27FC236}">
-                <a16:creationId xmlns:a16="http://schemas.microsoft.com/office/drawing/2014/main" id="{8662EA60-8CDC-AF40-A553-D07062CAE017}"/>
-              </a:ext>
-            </a:extLst>
-          </p:cNvPr>
-          <p:cNvSpPr>
-            <a:spLocks noGrp="1"/>
-          </p:cNvSpPr>
-          <p:nvPr>
-            <p:ph type="sldNum" sz="quarter" idx="12"/>
-          </p:nvPr>
-        </p:nvSpPr>
-        <p:spPr/>
-        <p:txBody>
-          <a:bodyPr/>
-          <a:lstStyle/>
-          <a:p>
-            <a:fld id="{FD063831-B998-4F9A-B0BB-9CE5946277BC}" type="slidenum">
-              <a:rPr lang="en-US" smtClean="0"/>
-              <a:pPr/>
-              <a:t>4</a:t>
             </a:fld>
             <a:endParaRPr lang="en-US" dirty="0"/>
           </a:p>
@@ -4835,8 +5226,8 @@
           </a:fontRef>
         </p:style>
       </p:cxnSp>
-      <mc:AlternateContent xmlns:mc="http://schemas.openxmlformats.org/markup-compatibility/2006">
-        <mc:Choice xmlns:a14="http://schemas.microsoft.com/office/drawing/2010/main" Requires="a14">
+      <mc:AlternateContent xmlns:mc="http://schemas.openxmlformats.org/markup-compatibility/2006" xmlns:a14="http://schemas.microsoft.com/office/drawing/2010/main">
+        <mc:Choice Requires="a14">
           <p:sp>
             <p:nvSpPr>
               <p:cNvPr id="16" name="TextBox 15">
@@ -4898,7 +5289,7 @@
             </p:txBody>
           </p:sp>
         </mc:Choice>
-        <mc:Fallback>
+        <mc:Fallback xmlns="">
           <p:sp>
             <p:nvSpPr>
               <p:cNvPr id="16" name="TextBox 15">
@@ -4943,8 +5334,8 @@
           </p:sp>
         </mc:Fallback>
       </mc:AlternateContent>
-      <mc:AlternateContent xmlns:mc="http://schemas.openxmlformats.org/markup-compatibility/2006">
-        <mc:Choice xmlns:a14="http://schemas.microsoft.com/office/drawing/2010/main" Requires="a14">
+      <mc:AlternateContent xmlns:mc="http://schemas.openxmlformats.org/markup-compatibility/2006" xmlns:a14="http://schemas.microsoft.com/office/drawing/2010/main">
+        <mc:Choice Requires="a14">
           <p:sp>
             <p:nvSpPr>
               <p:cNvPr id="17" name="TextBox 16">
@@ -5006,7 +5397,7 @@
             </p:txBody>
           </p:sp>
         </mc:Choice>
-        <mc:Fallback>
+        <mc:Fallback xmlns="">
           <p:sp>
             <p:nvSpPr>
               <p:cNvPr id="17" name="TextBox 16">
@@ -5064,7 +5455,7 @@
 </p:sld>
 </file>
 
-<file path=ppt/slides/slide5.xml><?xml version="1.0" encoding="utf-8"?>
+<file path=ppt/slides/slide4.xml><?xml version="1.0" encoding="utf-8"?>
 <p:sld xmlns:a="http://schemas.openxmlformats.org/drawingml/2006/main" xmlns:r="http://schemas.openxmlformats.org/officeDocument/2006/relationships" xmlns:p="http://schemas.openxmlformats.org/presentationml/2006/main">
   <p:cSld>
     <p:spTree>
@@ -5105,7 +5496,7 @@
             <a:fld id="{FD063831-B998-4F9A-B0BB-9CE5946277BC}" type="slidenum">
               <a:rPr lang="en-US" smtClean="0"/>
               <a:pPr/>
-              <a:t>5</a:t>
+              <a:t>4</a:t>
             </a:fld>
             <a:endParaRPr lang="en-US" dirty="0"/>
           </a:p>
@@ -5226,7 +5617,7 @@
                     </a:solidFill>
                     <a:latin typeface="Cambria" pitchFamily="18" charset="0"/>
                   </a:rPr>
-                  <a:t>Frequency 3 Cylinder Test (Measure 47)</a:t>
+                  <a:t>Frequency 3 Cylinder Test (Measure 47)c</a:t>
                 </a:r>
               </a:p>
             </p:txBody>
@@ -5301,7 +5692,7 @@
               <p:nvPr>
                 <p:extLst>
                   <p:ext uri="{D42A27DB-BD31-4B8C-83A1-F6EECF244321}">
-                    <p14:modId xmlns:p14="http://schemas.microsoft.com/office/powerpoint/2010/main" val="2902815540"/>
+                    <p14:modId xmlns:p14="http://schemas.microsoft.com/office/powerpoint/2010/main" val="863803750"/>
                   </p:ext>
                 </p:extLst>
               </p:nvPr>
@@ -5452,6 +5843,7 @@
                         <a:bodyPr/>
                         <a:lstStyle/>
                         <a:p>
+                          <a:pPr/>
                           <a14:m>
                             <m:oMathPara xmlns:m="http://schemas.openxmlformats.org/officeDocument/2006/math">
                               <m:oMathParaPr>
@@ -5579,6 +5971,7 @@
                         <a:bodyPr/>
                         <a:lstStyle/>
                         <a:p>
+                          <a:pPr/>
                           <a14:m>
                             <m:oMathPara xmlns:m="http://schemas.openxmlformats.org/officeDocument/2006/math">
                               <m:oMathParaPr>
@@ -5879,8 +6272,12 @@
                         <a:lstStyle/>
                         <a:p>
                           <a:r>
+                            <a:rPr lang="en-US"/>
+                            <a:t>32.045 </a:t>
+                          </a:r>
+                          <a:r>
                             <a:rPr lang="en-US" dirty="0"/>
-                            <a:t>-32.045 GHz</a:t>
+                            <a:t>GHz</a:t>
                           </a:r>
                         </a:p>
                       </a:txBody>
@@ -5926,7 +6323,7 @@
               <p:nvPr>
                 <p:extLst>
                   <p:ext uri="{D42A27DB-BD31-4B8C-83A1-F6EECF244321}">
-                    <p14:modId xmlns:p14="http://schemas.microsoft.com/office/powerpoint/2010/main" val="2902815540"/>
+                    <p14:modId xmlns:p14="http://schemas.microsoft.com/office/powerpoint/2010/main" val="863803750"/>
                   </p:ext>
                 </p:extLst>
               </p:nvPr>
@@ -6319,8 +6716,12 @@
                         <a:lstStyle/>
                         <a:p>
                           <a:r>
+                            <a:rPr lang="en-US"/>
+                            <a:t>32.045 </a:t>
+                          </a:r>
+                          <a:r>
                             <a:rPr lang="en-US" dirty="0"/>
-                            <a:t>-32.045 GHz</a:t>
+                            <a:t>GHz</a:t>
                           </a:r>
                         </a:p>
                       </a:txBody>
@@ -6351,8 +6752,8 @@
           </p:graphicFrame>
         </mc:Fallback>
       </mc:AlternateContent>
-      <mc:AlternateContent xmlns:mc="http://schemas.openxmlformats.org/markup-compatibility/2006">
-        <mc:Choice xmlns:a14="http://schemas.microsoft.com/office/drawing/2010/main" Requires="a14">
+      <mc:AlternateContent xmlns:mc="http://schemas.openxmlformats.org/markup-compatibility/2006" xmlns:a14="http://schemas.microsoft.com/office/drawing/2010/main">
+        <mc:Choice Requires="a14">
           <p:sp>
             <p:nvSpPr>
               <p:cNvPr id="5" name="TextBox 4">
@@ -6497,7 +6898,7 @@
             </p:txBody>
           </p:sp>
         </mc:Choice>
-        <mc:Fallback>
+        <mc:Fallback xmlns="">
           <p:sp>
             <p:nvSpPr>
               <p:cNvPr id="5" name="TextBox 4">
@@ -6902,8 +7303,8 @@
           </a:p>
         </p:txBody>
       </p:sp>
-      <mc:AlternateContent xmlns:mc="http://schemas.openxmlformats.org/markup-compatibility/2006">
-        <mc:Choice xmlns:a14="http://schemas.microsoft.com/office/drawing/2010/main" Requires="a14">
+      <mc:AlternateContent xmlns:mc="http://schemas.openxmlformats.org/markup-compatibility/2006" xmlns:a14="http://schemas.microsoft.com/office/drawing/2010/main">
+        <mc:Choice Requires="a14">
           <p:sp>
             <p:nvSpPr>
               <p:cNvPr id="14" name="TextBox 13">
@@ -6932,6 +7333,7 @@
               </a:bodyPr>
               <a:lstStyle/>
               <a:p>
+                <a:pPr/>
                 <a14:m>
                   <m:oMathPara xmlns:m="http://schemas.openxmlformats.org/officeDocument/2006/math">
                     <m:oMathParaPr>
@@ -6953,7 +7355,7 @@
             </p:txBody>
           </p:sp>
         </mc:Choice>
-        <mc:Fallback>
+        <mc:Fallback xmlns="">
           <p:sp>
             <p:nvSpPr>
               <p:cNvPr id="14" name="TextBox 13">
@@ -7163,8 +7565,8 @@
           </a:fontRef>
         </p:style>
       </p:cxnSp>
-      <mc:AlternateContent xmlns:mc="http://schemas.openxmlformats.org/markup-compatibility/2006">
-        <mc:Choice xmlns:a14="http://schemas.microsoft.com/office/drawing/2010/main" Requires="a14">
+      <mc:AlternateContent xmlns:mc="http://schemas.openxmlformats.org/markup-compatibility/2006" xmlns:a14="http://schemas.microsoft.com/office/drawing/2010/main">
+        <mc:Choice Requires="a14">
           <p:sp>
             <p:nvSpPr>
               <p:cNvPr id="21" name="TextBox 20">
@@ -7226,7 +7628,7 @@
             </p:txBody>
           </p:sp>
         </mc:Choice>
-        <mc:Fallback>
+        <mc:Fallback xmlns="">
           <p:sp>
             <p:nvSpPr>
               <p:cNvPr id="21" name="TextBox 20">
@@ -7271,8 +7673,8 @@
           </p:sp>
         </mc:Fallback>
       </mc:AlternateContent>
-      <mc:AlternateContent xmlns:mc="http://schemas.openxmlformats.org/markup-compatibility/2006">
-        <mc:Choice xmlns:a14="http://schemas.microsoft.com/office/drawing/2010/main" Requires="a14">
+      <mc:AlternateContent xmlns:mc="http://schemas.openxmlformats.org/markup-compatibility/2006" xmlns:a14="http://schemas.microsoft.com/office/drawing/2010/main">
+        <mc:Choice Requires="a14">
           <p:sp>
             <p:nvSpPr>
               <p:cNvPr id="22" name="TextBox 21">
@@ -7334,7 +7736,7 @@
             </p:txBody>
           </p:sp>
         </mc:Choice>
-        <mc:Fallback>
+        <mc:Fallback xmlns="">
           <p:sp>
             <p:nvSpPr>
               <p:cNvPr id="22" name="TextBox 21">
@@ -7435,8 +7837,8 @@
           </a:p>
         </p:txBody>
       </p:sp>
-      <mc:AlternateContent xmlns:mc="http://schemas.openxmlformats.org/markup-compatibility/2006">
-        <mc:Choice xmlns:a14="http://schemas.microsoft.com/office/drawing/2010/main" Requires="a14">
+      <mc:AlternateContent xmlns:mc="http://schemas.openxmlformats.org/markup-compatibility/2006" xmlns:a14="http://schemas.microsoft.com/office/drawing/2010/main">
+        <mc:Choice Requires="a14">
           <p:sp>
             <p:nvSpPr>
               <p:cNvPr id="24" name="TextBox 23">
@@ -7465,6 +7867,7 @@
               </a:bodyPr>
               <a:lstStyle/>
               <a:p>
+                <a:pPr/>
                 <a14:m>
                   <m:oMathPara xmlns:m="http://schemas.openxmlformats.org/officeDocument/2006/math">
                     <m:oMathParaPr>
@@ -7486,7 +7889,7 @@
             </p:txBody>
           </p:sp>
         </mc:Choice>
-        <mc:Fallback>
+        <mc:Fallback xmlns="">
           <p:sp>
             <p:nvSpPr>
               <p:cNvPr id="24" name="TextBox 23">
@@ -7591,7 +7994,573 @@
 </p:sld>
 </file>
 
+<file path=ppt/slides/slide5.xml><?xml version="1.0" encoding="utf-8"?>
+<p:sld xmlns:a="http://schemas.openxmlformats.org/drawingml/2006/main" xmlns:r="http://schemas.openxmlformats.org/officeDocument/2006/relationships" xmlns:p="http://schemas.openxmlformats.org/presentationml/2006/main">
+  <p:cSld>
+    <p:spTree>
+      <p:nvGrpSpPr>
+        <p:cNvPr id="1" name=""/>
+        <p:cNvGrpSpPr/>
+        <p:nvPr/>
+      </p:nvGrpSpPr>
+      <p:grpSpPr>
+        <a:xfrm>
+          <a:off x="0" y="0"/>
+          <a:ext cx="0" cy="0"/>
+          <a:chOff x="0" y="0"/>
+          <a:chExt cx="0" cy="0"/>
+        </a:xfrm>
+      </p:grpSpPr>
+      <p:sp>
+        <p:nvSpPr>
+          <p:cNvPr id="2" name="Slide Number Placeholder 1">
+            <a:extLst>
+              <a:ext uri="{FF2B5EF4-FFF2-40B4-BE49-F238E27FC236}">
+                <a16:creationId xmlns:a16="http://schemas.microsoft.com/office/drawing/2014/main" id="{C0C2F36D-D250-E043-9677-2547E06DE0D5}"/>
+              </a:ext>
+            </a:extLst>
+          </p:cNvPr>
+          <p:cNvSpPr>
+            <a:spLocks noGrp="1"/>
+          </p:cNvSpPr>
+          <p:nvPr>
+            <p:ph type="sldNum" sz="quarter" idx="12"/>
+          </p:nvPr>
+        </p:nvSpPr>
+        <p:spPr/>
+        <p:txBody>
+          <a:bodyPr/>
+          <a:lstStyle/>
+          <a:p>
+            <a:fld id="{FD063831-B998-4F9A-B0BB-9CE5946277BC}" type="slidenum">
+              <a:rPr lang="en-US" smtClean="0"/>
+              <a:pPr/>
+              <a:t>5</a:t>
+            </a:fld>
+            <a:endParaRPr lang="en-US" dirty="0"/>
+          </a:p>
+        </p:txBody>
+      </p:sp>
+      <p:sp>
+        <p:nvSpPr>
+          <p:cNvPr id="3" name="Title 1">
+            <a:extLst>
+              <a:ext uri="{FF2B5EF4-FFF2-40B4-BE49-F238E27FC236}">
+                <a16:creationId xmlns:a16="http://schemas.microsoft.com/office/drawing/2014/main" id="{466F4493-47B1-4346-AF45-FB916CCD30F5}"/>
+              </a:ext>
+            </a:extLst>
+          </p:cNvPr>
+          <p:cNvSpPr txBox="1">
+            <a:spLocks/>
+          </p:cNvSpPr>
+          <p:nvPr/>
+        </p:nvSpPr>
+        <p:spPr>
+          <a:xfrm>
+            <a:off x="685893" y="169301"/>
+            <a:ext cx="8458107" cy="668337"/>
+          </a:xfrm>
+          <a:prstGeom prst="rect">
+            <a:avLst/>
+          </a:prstGeom>
+          <a:effectLst>
+            <a:outerShdw blurRad="50800" dist="38100" dir="2700000" algn="tl" rotWithShape="0">
+              <a:prstClr val="black">
+                <a:alpha val="40000"/>
+              </a:prstClr>
+            </a:outerShdw>
+          </a:effectLst>
+        </p:spPr>
+        <p:txBody>
+          <a:bodyPr>
+            <a:normAutofit/>
+          </a:bodyPr>
+          <a:lstStyle>
+            <a:lvl1pPr algn="ctr" defTabSz="914400" rtl="0" eaLnBrk="1" latinLnBrk="0" hangingPunct="1">
+              <a:spcBef>
+                <a:spcPct val="0"/>
+              </a:spcBef>
+              <a:buNone/>
+              <a:defRPr sz="4400" kern="1200">
+                <a:solidFill>
+                  <a:schemeClr val="tx1"/>
+                </a:solidFill>
+                <a:latin typeface="+mj-lt"/>
+                <a:ea typeface="+mj-ea"/>
+                <a:cs typeface="+mj-cs"/>
+              </a:defRPr>
+            </a:lvl1pPr>
+          </a:lstStyle>
+          <a:p>
+            <a:r>
+              <a:rPr lang="en-US" sz="2400" b="1" dirty="0">
+                <a:solidFill>
+                  <a:schemeClr val="bg1"/>
+                </a:solidFill>
+                <a:latin typeface="Cambria" pitchFamily="18" charset="0"/>
+              </a:rPr>
+              <a:t>NFF Generated Image</a:t>
+            </a:r>
+          </a:p>
+        </p:txBody>
+      </p:sp>
+      <p:pic>
+        <p:nvPicPr>
+          <p:cNvPr id="11" name="Picture 10" descr="Chart, scatter chart&#10;&#10;Description automatically generated">
+            <a:extLst>
+              <a:ext uri="{FF2B5EF4-FFF2-40B4-BE49-F238E27FC236}">
+                <a16:creationId xmlns:a16="http://schemas.microsoft.com/office/drawing/2014/main" id="{8316AB40-F07C-7F41-8B7E-5A6C75807461}"/>
+              </a:ext>
+            </a:extLst>
+          </p:cNvPr>
+          <p:cNvPicPr>
+            <a:picLocks noChangeAspect="1"/>
+          </p:cNvPicPr>
+          <p:nvPr/>
+        </p:nvPicPr>
+        <p:blipFill>
+          <a:blip r:embed="rId2">
+            <a:extLst>
+              <a:ext uri="{28A0092B-C50C-407E-A947-70E740481C1C}">
+                <a14:useLocalDpi xmlns:a14="http://schemas.microsoft.com/office/drawing/2010/main" val="0"/>
+              </a:ext>
+            </a:extLst>
+          </a:blip>
+          <a:stretch>
+            <a:fillRect/>
+          </a:stretch>
+        </p:blipFill>
+        <p:spPr>
+          <a:xfrm>
+            <a:off x="5085108" y="3879206"/>
+            <a:ext cx="3649517" cy="2809493"/>
+          </a:xfrm>
+          <a:prstGeom prst="rect">
+            <a:avLst/>
+          </a:prstGeom>
+        </p:spPr>
+      </p:pic>
+      <p:sp>
+        <p:nvSpPr>
+          <p:cNvPr id="12" name="TextBox 11">
+            <a:extLst>
+              <a:ext uri="{FF2B5EF4-FFF2-40B4-BE49-F238E27FC236}">
+                <a16:creationId xmlns:a16="http://schemas.microsoft.com/office/drawing/2014/main" id="{BFD30495-39CC-A84F-AE8B-565CE1237C78}"/>
+              </a:ext>
+            </a:extLst>
+          </p:cNvPr>
+          <p:cNvSpPr txBox="1"/>
+          <p:nvPr/>
+        </p:nvSpPr>
+        <p:spPr>
+          <a:xfrm>
+            <a:off x="6235569" y="4001468"/>
+            <a:ext cx="1458410" cy="369332"/>
+          </a:xfrm>
+          <a:prstGeom prst="rect">
+            <a:avLst/>
+          </a:prstGeom>
+          <a:noFill/>
+        </p:spPr>
+        <p:txBody>
+          <a:bodyPr wrap="square" rtlCol="0">
+            <a:spAutoFit/>
+          </a:bodyPr>
+          <a:lstStyle/>
+          <a:p>
+            <a:r>
+              <a:rPr lang="en-US" dirty="0"/>
+              <a:t>Thresh = 0.1</a:t>
+            </a:r>
+          </a:p>
+        </p:txBody>
+      </p:sp>
+      <p:pic>
+        <p:nvPicPr>
+          <p:cNvPr id="13" name="Picture 12" descr="Chart, scatter chart&#10;&#10;Description automatically generated">
+            <a:extLst>
+              <a:ext uri="{FF2B5EF4-FFF2-40B4-BE49-F238E27FC236}">
+                <a16:creationId xmlns:a16="http://schemas.microsoft.com/office/drawing/2014/main" id="{E79A2E4A-4AA9-9A43-8F56-62AEE31D5BEB}"/>
+              </a:ext>
+            </a:extLst>
+          </p:cNvPr>
+          <p:cNvPicPr>
+            <a:picLocks noChangeAspect="1"/>
+          </p:cNvPicPr>
+          <p:nvPr/>
+        </p:nvPicPr>
+        <p:blipFill>
+          <a:blip r:embed="rId3">
+            <a:extLst>
+              <a:ext uri="{28A0092B-C50C-407E-A947-70E740481C1C}">
+                <a14:useLocalDpi xmlns:a14="http://schemas.microsoft.com/office/drawing/2010/main" val="0"/>
+              </a:ext>
+            </a:extLst>
+          </a:blip>
+          <a:stretch>
+            <a:fillRect/>
+          </a:stretch>
+        </p:blipFill>
+        <p:spPr>
+          <a:xfrm>
+            <a:off x="360774" y="3842795"/>
+            <a:ext cx="3794537" cy="2845903"/>
+          </a:xfrm>
+          <a:prstGeom prst="rect">
+            <a:avLst/>
+          </a:prstGeom>
+        </p:spPr>
+      </p:pic>
+      <p:sp>
+        <p:nvSpPr>
+          <p:cNvPr id="14" name="TextBox 13">
+            <a:extLst>
+              <a:ext uri="{FF2B5EF4-FFF2-40B4-BE49-F238E27FC236}">
+                <a16:creationId xmlns:a16="http://schemas.microsoft.com/office/drawing/2014/main" id="{995D6E39-EDE3-1D4C-8FCC-C96C2E1E4D8B}"/>
+              </a:ext>
+            </a:extLst>
+          </p:cNvPr>
+          <p:cNvSpPr txBox="1"/>
+          <p:nvPr/>
+        </p:nvSpPr>
+        <p:spPr>
+          <a:xfrm>
+            <a:off x="1528837" y="3879206"/>
+            <a:ext cx="1458410" cy="369332"/>
+          </a:xfrm>
+          <a:prstGeom prst="rect">
+            <a:avLst/>
+          </a:prstGeom>
+          <a:noFill/>
+        </p:spPr>
+        <p:txBody>
+          <a:bodyPr wrap="square" rtlCol="0">
+            <a:spAutoFit/>
+          </a:bodyPr>
+          <a:lstStyle/>
+          <a:p>
+            <a:r>
+              <a:rPr lang="en-US" dirty="0"/>
+              <a:t>Thresh = 0.2</a:t>
+            </a:r>
+          </a:p>
+        </p:txBody>
+      </p:sp>
+      <p:pic>
+        <p:nvPicPr>
+          <p:cNvPr id="15" name="Picture 14" descr="Chart, scatter chart&#10;&#10;Description automatically generated">
+            <a:extLst>
+              <a:ext uri="{FF2B5EF4-FFF2-40B4-BE49-F238E27FC236}">
+                <a16:creationId xmlns:a16="http://schemas.microsoft.com/office/drawing/2014/main" id="{1AAF89CB-17FD-9E43-A0CA-01F5E9C3AA12}"/>
+              </a:ext>
+            </a:extLst>
+          </p:cNvPr>
+          <p:cNvPicPr>
+            <a:picLocks noChangeAspect="1"/>
+          </p:cNvPicPr>
+          <p:nvPr/>
+        </p:nvPicPr>
+        <p:blipFill>
+          <a:blip r:embed="rId4">
+            <a:extLst>
+              <a:ext uri="{28A0092B-C50C-407E-A947-70E740481C1C}">
+                <a14:useLocalDpi xmlns:a14="http://schemas.microsoft.com/office/drawing/2010/main" val="0"/>
+              </a:ext>
+            </a:extLst>
+          </a:blip>
+          <a:stretch>
+            <a:fillRect/>
+          </a:stretch>
+        </p:blipFill>
+        <p:spPr>
+          <a:xfrm>
+            <a:off x="5085108" y="868407"/>
+            <a:ext cx="3649517" cy="2775591"/>
+          </a:xfrm>
+          <a:prstGeom prst="rect">
+            <a:avLst/>
+          </a:prstGeom>
+        </p:spPr>
+      </p:pic>
+      <p:sp>
+        <p:nvSpPr>
+          <p:cNvPr id="16" name="TextBox 15">
+            <a:extLst>
+              <a:ext uri="{FF2B5EF4-FFF2-40B4-BE49-F238E27FC236}">
+                <a16:creationId xmlns:a16="http://schemas.microsoft.com/office/drawing/2014/main" id="{0061F21B-0D03-E245-BEED-21873024EC98}"/>
+              </a:ext>
+            </a:extLst>
+          </p:cNvPr>
+          <p:cNvSpPr txBox="1"/>
+          <p:nvPr/>
+        </p:nvSpPr>
+        <p:spPr>
+          <a:xfrm>
+            <a:off x="6180661" y="868407"/>
+            <a:ext cx="1458410" cy="369332"/>
+          </a:xfrm>
+          <a:prstGeom prst="rect">
+            <a:avLst/>
+          </a:prstGeom>
+          <a:noFill/>
+        </p:spPr>
+        <p:txBody>
+          <a:bodyPr wrap="square" rtlCol="0">
+            <a:spAutoFit/>
+          </a:bodyPr>
+          <a:lstStyle/>
+          <a:p>
+            <a:r>
+              <a:rPr lang="en-US" dirty="0"/>
+              <a:t>Thresh = 0.3</a:t>
+            </a:r>
+          </a:p>
+        </p:txBody>
+      </p:sp>
+      <p:pic>
+        <p:nvPicPr>
+          <p:cNvPr id="17" name="Picture 16" descr="Chart, scatter chart&#10;&#10;Description automatically generated">
+            <a:extLst>
+              <a:ext uri="{FF2B5EF4-FFF2-40B4-BE49-F238E27FC236}">
+                <a16:creationId xmlns:a16="http://schemas.microsoft.com/office/drawing/2014/main" id="{1C9FD3B6-4A11-DF43-A116-8A58B779936D}"/>
+              </a:ext>
+            </a:extLst>
+          </p:cNvPr>
+          <p:cNvPicPr>
+            <a:picLocks noChangeAspect="1"/>
+          </p:cNvPicPr>
+          <p:nvPr/>
+        </p:nvPicPr>
+        <p:blipFill>
+          <a:blip r:embed="rId5">
+            <a:extLst>
+              <a:ext uri="{28A0092B-C50C-407E-A947-70E740481C1C}">
+                <a14:useLocalDpi xmlns:a14="http://schemas.microsoft.com/office/drawing/2010/main" val="0"/>
+              </a:ext>
+            </a:extLst>
+          </a:blip>
+          <a:stretch>
+            <a:fillRect/>
+          </a:stretch>
+        </p:blipFill>
+        <p:spPr>
+          <a:xfrm>
+            <a:off x="360774" y="917194"/>
+            <a:ext cx="3794537" cy="2797116"/>
+          </a:xfrm>
+          <a:prstGeom prst="rect">
+            <a:avLst/>
+          </a:prstGeom>
+        </p:spPr>
+      </p:pic>
+      <p:sp>
+        <p:nvSpPr>
+          <p:cNvPr id="18" name="TextBox 17">
+            <a:extLst>
+              <a:ext uri="{FF2B5EF4-FFF2-40B4-BE49-F238E27FC236}">
+                <a16:creationId xmlns:a16="http://schemas.microsoft.com/office/drawing/2014/main" id="{081824CF-ADE1-514C-A6D8-CBA73C4C8255}"/>
+              </a:ext>
+            </a:extLst>
+          </p:cNvPr>
+          <p:cNvSpPr txBox="1"/>
+          <p:nvPr/>
+        </p:nvSpPr>
+        <p:spPr>
+          <a:xfrm>
+            <a:off x="1528837" y="917194"/>
+            <a:ext cx="1458410" cy="369332"/>
+          </a:xfrm>
+          <a:prstGeom prst="rect">
+            <a:avLst/>
+          </a:prstGeom>
+          <a:noFill/>
+        </p:spPr>
+        <p:txBody>
+          <a:bodyPr wrap="square" rtlCol="0">
+            <a:spAutoFit/>
+          </a:bodyPr>
+          <a:lstStyle/>
+          <a:p>
+            <a:r>
+              <a:rPr lang="en-US" dirty="0"/>
+              <a:t>Thresh = 0.4</a:t>
+            </a:r>
+          </a:p>
+        </p:txBody>
+      </p:sp>
+    </p:spTree>
+    <p:extLst>
+      <p:ext uri="{BB962C8B-B14F-4D97-AF65-F5344CB8AC3E}">
+        <p14:creationId xmlns:p14="http://schemas.microsoft.com/office/powerpoint/2010/main" val="99434241"/>
+      </p:ext>
+    </p:extLst>
+  </p:cSld>
+  <p:clrMapOvr>
+    <a:masterClrMapping/>
+  </p:clrMapOvr>
+</p:sld>
+</file>
+
 <file path=ppt/slides/slide6.xml><?xml version="1.0" encoding="utf-8"?>
+<p:sld xmlns:a="http://schemas.openxmlformats.org/drawingml/2006/main" xmlns:r="http://schemas.openxmlformats.org/officeDocument/2006/relationships" xmlns:p="http://schemas.openxmlformats.org/presentationml/2006/main">
+  <p:cSld>
+    <p:spTree>
+      <p:nvGrpSpPr>
+        <p:cNvPr id="1" name=""/>
+        <p:cNvGrpSpPr/>
+        <p:nvPr/>
+      </p:nvGrpSpPr>
+      <p:grpSpPr>
+        <a:xfrm>
+          <a:off x="0" y="0"/>
+          <a:ext cx="0" cy="0"/>
+          <a:chOff x="0" y="0"/>
+          <a:chExt cx="0" cy="0"/>
+        </a:xfrm>
+      </p:grpSpPr>
+      <p:sp>
+        <p:nvSpPr>
+          <p:cNvPr id="2" name="Slide Number Placeholder 1">
+            <a:extLst>
+              <a:ext uri="{FF2B5EF4-FFF2-40B4-BE49-F238E27FC236}">
+                <a16:creationId xmlns:a16="http://schemas.microsoft.com/office/drawing/2014/main" id="{308F5B2E-1F42-244E-ADB8-852865043C74}"/>
+              </a:ext>
+            </a:extLst>
+          </p:cNvPr>
+          <p:cNvSpPr>
+            <a:spLocks noGrp="1"/>
+          </p:cNvSpPr>
+          <p:nvPr>
+            <p:ph type="sldNum" sz="quarter" idx="12"/>
+          </p:nvPr>
+        </p:nvSpPr>
+        <p:spPr/>
+        <p:txBody>
+          <a:bodyPr/>
+          <a:lstStyle/>
+          <a:p>
+            <a:fld id="{FD063831-B998-4F9A-B0BB-9CE5946277BC}" type="slidenum">
+              <a:rPr lang="en-US" smtClean="0"/>
+              <a:pPr/>
+              <a:t>6</a:t>
+            </a:fld>
+            <a:endParaRPr lang="en-US" dirty="0"/>
+          </a:p>
+        </p:txBody>
+      </p:sp>
+      <p:sp>
+        <p:nvSpPr>
+          <p:cNvPr id="3" name="Title 1">
+            <a:extLst>
+              <a:ext uri="{FF2B5EF4-FFF2-40B4-BE49-F238E27FC236}">
+                <a16:creationId xmlns:a16="http://schemas.microsoft.com/office/drawing/2014/main" id="{0EA22405-5559-4446-98E4-A3517319133F}"/>
+              </a:ext>
+            </a:extLst>
+          </p:cNvPr>
+          <p:cNvSpPr txBox="1">
+            <a:spLocks/>
+          </p:cNvSpPr>
+          <p:nvPr/>
+        </p:nvSpPr>
+        <p:spPr>
+          <a:xfrm>
+            <a:off x="685893" y="169301"/>
+            <a:ext cx="8458107" cy="668337"/>
+          </a:xfrm>
+          <a:prstGeom prst="rect">
+            <a:avLst/>
+          </a:prstGeom>
+          <a:effectLst>
+            <a:outerShdw blurRad="50800" dist="38100" dir="2700000" algn="tl" rotWithShape="0">
+              <a:prstClr val="black">
+                <a:alpha val="40000"/>
+              </a:prstClr>
+            </a:outerShdw>
+          </a:effectLst>
+        </p:spPr>
+        <p:txBody>
+          <a:bodyPr>
+            <a:normAutofit/>
+          </a:bodyPr>
+          <a:lstStyle>
+            <a:lvl1pPr algn="ctr" defTabSz="914400" rtl="0" eaLnBrk="1" latinLnBrk="0" hangingPunct="1">
+              <a:spcBef>
+                <a:spcPct val="0"/>
+              </a:spcBef>
+              <a:buNone/>
+              <a:defRPr sz="4400" kern="1200">
+                <a:solidFill>
+                  <a:schemeClr val="tx1"/>
+                </a:solidFill>
+                <a:latin typeface="+mj-lt"/>
+                <a:ea typeface="+mj-ea"/>
+                <a:cs typeface="+mj-cs"/>
+              </a:defRPr>
+            </a:lvl1pPr>
+          </a:lstStyle>
+          <a:p>
+            <a:r>
+              <a:rPr lang="en-US" sz="2400" b="1" dirty="0">
+                <a:solidFill>
+                  <a:schemeClr val="bg1"/>
+                </a:solidFill>
+                <a:latin typeface="Cambria" pitchFamily="18" charset="0"/>
+              </a:rPr>
+              <a:t>Antenna Configuration</a:t>
+            </a:r>
+          </a:p>
+        </p:txBody>
+      </p:sp>
+      <p:pic>
+        <p:nvPicPr>
+          <p:cNvPr id="5" name="Picture 4" descr="Chart&#10;&#10;Description automatically generated">
+            <a:extLst>
+              <a:ext uri="{FF2B5EF4-FFF2-40B4-BE49-F238E27FC236}">
+                <a16:creationId xmlns:a16="http://schemas.microsoft.com/office/drawing/2014/main" id="{B7E337F0-0D4D-0341-BA07-D297F2FD28E9}"/>
+              </a:ext>
+            </a:extLst>
+          </p:cNvPr>
+          <p:cNvPicPr>
+            <a:picLocks noChangeAspect="1"/>
+          </p:cNvPicPr>
+          <p:nvPr/>
+        </p:nvPicPr>
+        <p:blipFill>
+          <a:blip r:embed="rId2">
+            <a:extLst>
+              <a:ext uri="{28A0092B-C50C-407E-A947-70E740481C1C}">
+                <a14:useLocalDpi xmlns:a14="http://schemas.microsoft.com/office/drawing/2010/main" val="0"/>
+              </a:ext>
+            </a:extLst>
+          </a:blip>
+          <a:stretch>
+            <a:fillRect/>
+          </a:stretch>
+        </p:blipFill>
+        <p:spPr>
+          <a:xfrm>
+            <a:off x="1530396" y="1087156"/>
+            <a:ext cx="6769100" cy="5156200"/>
+          </a:xfrm>
+          <a:prstGeom prst="rect">
+            <a:avLst/>
+          </a:prstGeom>
+        </p:spPr>
+      </p:pic>
+    </p:spTree>
+    <p:extLst>
+      <p:ext uri="{BB962C8B-B14F-4D97-AF65-F5344CB8AC3E}">
+        <p14:creationId xmlns:p14="http://schemas.microsoft.com/office/powerpoint/2010/main" val="1329548082"/>
+      </p:ext>
+    </p:extLst>
+  </p:cSld>
+  <p:clrMapOvr>
+    <a:masterClrMapping/>
+  </p:clrMapOvr>
+</p:sld>
+</file>
+
+<file path=ppt/slides/slide7.xml><?xml version="1.0" encoding="utf-8"?>
 <p:sld xmlns:a="http://schemas.openxmlformats.org/drawingml/2006/main" xmlns:r="http://schemas.openxmlformats.org/officeDocument/2006/relationships" xmlns:p="http://schemas.openxmlformats.org/presentationml/2006/main">
   <p:cSld>
     <p:spTree>
@@ -7632,7 +8601,7 @@
             <a:fld id="{FD063831-B998-4F9A-B0BB-9CE5946277BC}" type="slidenum">
               <a:rPr lang="en-US" smtClean="0"/>
               <a:pPr/>
-              <a:t>6</a:t>
+              <a:t>7</a:t>
             </a:fld>
             <a:endParaRPr lang="en-US" dirty="0"/>
           </a:p>
@@ -7709,8 +8678,8 @@
           </a:p>
         </p:txBody>
       </p:sp>
-      <mc:AlternateContent xmlns:mc="http://schemas.openxmlformats.org/markup-compatibility/2006">
-        <mc:Choice xmlns:a14="http://schemas.microsoft.com/office/drawing/2010/main" Requires="a14">
+      <mc:AlternateContent xmlns:mc="http://schemas.openxmlformats.org/markup-compatibility/2006" xmlns:a14="http://schemas.microsoft.com/office/drawing/2010/main">
+        <mc:Choice Requires="a14">
           <p:sp>
             <p:nvSpPr>
               <p:cNvPr id="4" name="TextBox 3">
@@ -8388,7 +9357,7 @@
             </p:txBody>
           </p:sp>
         </mc:Choice>
-        <mc:Fallback>
+        <mc:Fallback xmlns="">
           <p:sp>
             <p:nvSpPr>
               <p:cNvPr id="4" name="TextBox 3">
@@ -8506,7 +9475,7 @@
 </p:sld>
 </file>
 
-<file path=ppt/slides/slide7.xml><?xml version="1.0" encoding="utf-8"?>
+<file path=ppt/slides/slide8.xml><?xml version="1.0" encoding="utf-8"?>
 <p:sld xmlns:a="http://schemas.openxmlformats.org/drawingml/2006/main" xmlns:r="http://schemas.openxmlformats.org/officeDocument/2006/relationships" xmlns:p="http://schemas.openxmlformats.org/presentationml/2006/main">
   <p:cSld>
     <p:spTree>
@@ -8547,7 +9516,7 @@
             <a:fld id="{FD063831-B998-4F9A-B0BB-9CE5946277BC}" type="slidenum">
               <a:rPr lang="en-US" smtClean="0"/>
               <a:pPr/>
-              <a:t>7</a:t>
+              <a:t>8</a:t>
             </a:fld>
             <a:endParaRPr lang="en-US" dirty="0"/>
           </a:p>
@@ -9848,7 +10817,7 @@
 </p:sld>
 </file>
 
-<file path=ppt/slides/slide8.xml><?xml version="1.0" encoding="utf-8"?>
+<file path=ppt/slides/slide9.xml><?xml version="1.0" encoding="utf-8"?>
 <p:sld xmlns:a="http://schemas.openxmlformats.org/drawingml/2006/main" xmlns:r="http://schemas.openxmlformats.org/officeDocument/2006/relationships" xmlns:p="http://schemas.openxmlformats.org/presentationml/2006/main">
   <p:cSld>
     <p:spTree>
@@ -9889,7 +10858,7 @@
             <a:fld id="{FD063831-B998-4F9A-B0BB-9CE5946277BC}" type="slidenum">
               <a:rPr lang="en-US" smtClean="0"/>
               <a:pPr/>
-              <a:t>8</a:t>
+              <a:t>9</a:t>
             </a:fld>
             <a:endParaRPr lang="en-US" dirty="0"/>
           </a:p>
@@ -10756,8 +11725,8 @@
           </p:sp>
         </mc:Fallback>
       </mc:AlternateContent>
-      <mc:AlternateContent xmlns:mc="http://schemas.openxmlformats.org/markup-compatibility/2006">
-        <mc:Choice xmlns:a14="http://schemas.microsoft.com/office/drawing/2010/main" Requires="a14">
+      <mc:AlternateContent xmlns:mc="http://schemas.openxmlformats.org/markup-compatibility/2006" xmlns:a14="http://schemas.microsoft.com/office/drawing/2010/main">
+        <mc:Choice Requires="a14">
           <p:sp>
             <p:nvSpPr>
               <p:cNvPr id="19" name="TextBox 18">
@@ -11373,7 +12342,7 @@
             </p:txBody>
           </p:sp>
         </mc:Choice>
-        <mc:Fallback>
+        <mc:Fallback xmlns="">
           <p:sp>
             <p:nvSpPr>
               <p:cNvPr id="19" name="TextBox 18">

</xml_diff>

<commit_message>
Updated to include all files
</commit_message>
<xml_diff>
--- a/attempt1_3Cylinders_Undersampled/6_7_2021_DOA.pptx
+++ b/attempt1_3Cylinders_Undersampled/6_7_2021_DOA.pptx
@@ -2917,8 +2917,8 @@
           </a:fontRef>
         </p:style>
       </p:cxnSp>
-      <mc:AlternateContent xmlns:mc="http://schemas.openxmlformats.org/markup-compatibility/2006">
-        <mc:Choice xmlns:a14="http://schemas.microsoft.com/office/drawing/2010/main" Requires="a14">
+      <mc:AlternateContent xmlns:mc="http://schemas.openxmlformats.org/markup-compatibility/2006" xmlns:a14="http://schemas.microsoft.com/office/drawing/2010/main">
+        <mc:Choice Requires="a14">
           <p:sp>
             <p:nvSpPr>
               <p:cNvPr id="67" name="TextBox 66">
@@ -3458,7 +3458,7 @@
             </p:txBody>
           </p:sp>
         </mc:Choice>
-        <mc:Fallback>
+        <mc:Fallback xmlns="">
           <p:sp>
             <p:nvSpPr>
               <p:cNvPr id="67" name="TextBox 66">
@@ -3626,8 +3626,8 @@
           </a:p>
         </p:txBody>
       </p:sp>
-      <mc:AlternateContent xmlns:mc="http://schemas.openxmlformats.org/markup-compatibility/2006">
-        <mc:Choice xmlns:a14="http://schemas.microsoft.com/office/drawing/2010/main" Requires="a14">
+      <mc:AlternateContent xmlns:mc="http://schemas.openxmlformats.org/markup-compatibility/2006" xmlns:a14="http://schemas.microsoft.com/office/drawing/2010/main">
+        <mc:Choice Requires="a14">
           <p:sp>
             <p:nvSpPr>
               <p:cNvPr id="4" name="TextBox 3">
@@ -4298,7 +4298,7 @@
             </p:txBody>
           </p:sp>
         </mc:Choice>
-        <mc:Fallback>
+        <mc:Fallback xmlns="">
           <p:sp>
             <p:nvSpPr>
               <p:cNvPr id="4" name="TextBox 3">
@@ -5502,8 +5502,8 @@
           </a:p>
         </p:txBody>
       </p:sp>
-      <mc:AlternateContent xmlns:mc="http://schemas.openxmlformats.org/markup-compatibility/2006">
-        <mc:Choice xmlns:a14="http://schemas.microsoft.com/office/drawing/2010/main" Requires="a14">
+      <mc:AlternateContent xmlns:mc="http://schemas.openxmlformats.org/markup-compatibility/2006" xmlns:a14="http://schemas.microsoft.com/office/drawing/2010/main">
+        <mc:Choice Requires="a14">
           <p:sp>
             <p:nvSpPr>
               <p:cNvPr id="3" name="Title 1">
@@ -5623,7 +5623,7 @@
             </p:txBody>
           </p:sp>
         </mc:Choice>
-        <mc:Fallback>
+        <mc:Fallback xmlns="">
           <p:sp>
             <p:nvSpPr>
               <p:cNvPr id="3" name="Title 1">
@@ -5675,8 +5675,8 @@
           </p:sp>
         </mc:Fallback>
       </mc:AlternateContent>
-      <mc:AlternateContent xmlns:mc="http://schemas.openxmlformats.org/markup-compatibility/2006">
-        <mc:Choice xmlns:a14="http://schemas.microsoft.com/office/drawing/2010/main" Requires="a14">
+      <mc:AlternateContent xmlns:mc="http://schemas.openxmlformats.org/markup-compatibility/2006" xmlns:a14="http://schemas.microsoft.com/office/drawing/2010/main">
+        <mc:Choice Requires="a14">
           <p:graphicFrame>
             <p:nvGraphicFramePr>
               <p:cNvPr id="4" name="Table 11">
@@ -5692,7 +5692,7 @@
               <p:nvPr>
                 <p:extLst>
                   <p:ext uri="{D42A27DB-BD31-4B8C-83A1-F6EECF244321}">
-                    <p14:modId xmlns:p14="http://schemas.microsoft.com/office/powerpoint/2010/main" val="863803750"/>
+                    <p14:modId xmlns:p14="http://schemas.microsoft.com/office/powerpoint/2010/main" val="3180520510"/>
                   </p:ext>
                 </p:extLst>
               </p:nvPr>
@@ -6307,7 +6307,7 @@
             </a:graphic>
           </p:graphicFrame>
         </mc:Choice>
-        <mc:Fallback>
+        <mc:Fallback xmlns="">
           <p:graphicFrame>
             <p:nvGraphicFramePr>
               <p:cNvPr id="4" name="Table 11">
@@ -6323,7 +6323,7 @@
               <p:nvPr>
                 <p:extLst>
                   <p:ext uri="{D42A27DB-BD31-4B8C-83A1-F6EECF244321}">
-                    <p14:modId xmlns:p14="http://schemas.microsoft.com/office/powerpoint/2010/main" val="863803750"/>
+                    <p14:modId xmlns:p14="http://schemas.microsoft.com/office/powerpoint/2010/main" val="3180520510"/>
                   </p:ext>
                 </p:extLst>
               </p:nvPr>

</xml_diff>